<commit_message>
Updating package structure figure and User guide
</commit_message>
<xml_diff>
--- a/extras/figures.pptx
+++ b/extras/figures.pptx
@@ -3664,8 +3664,8 @@
         </p:nvSpPr>
         <p:spPr>
           <a:xfrm>
-            <a:off x="1243633" y="1315134"/>
-            <a:ext cx="1808508" cy="646331"/>
+            <a:off x="1595847" y="1225010"/>
+            <a:ext cx="1093569" cy="369332"/>
           </a:xfrm>
           <a:prstGeom prst="rect">
             <a:avLst/>
@@ -3683,20 +3683,8 @@
               <a:rPr lang="en-US" b="1" dirty="0">
                 <a:latin typeface="Comic Sans MS" panose="030F0702030302020204" pitchFamily="66" charset="0"/>
               </a:rPr>
-              <a:t>Clone or Copy </a:t>
-            </a:r>
-          </a:p>
-          <a:p>
-            <a:pPr algn="ctr"/>
-            <a:r>
-              <a:rPr lang="en-US" b="1" dirty="0" err="1">
-                <a:latin typeface="Comic Sans MS" panose="030F0702030302020204" pitchFamily="66" charset="0"/>
-              </a:rPr>
-              <a:t>pytemplate</a:t>
-            </a:r>
-            <a:endParaRPr lang="en-US" b="1" dirty="0">
-              <a:latin typeface="Comic Sans MS" panose="030F0702030302020204" pitchFamily="66" charset="0"/>
-            </a:endParaRPr>
+              <a:t>Clone or</a:t>
+            </a:r>
           </a:p>
         </p:txBody>
       </p:sp>
@@ -4452,6 +4440,36 @@
           </a:p>
         </p:txBody>
       </p:sp>
+      <p:pic>
+        <p:nvPicPr>
+          <p:cNvPr id="3" name="Picture 2">
+            <a:extLst>
+              <a:ext uri="{FF2B5EF4-FFF2-40B4-BE49-F238E27FC236}">
+                <a16:creationId xmlns:a16="http://schemas.microsoft.com/office/drawing/2014/main" id="{BB807DDC-368A-E20B-44A0-6D98A76579E4}"/>
+              </a:ext>
+            </a:extLst>
+          </p:cNvPr>
+          <p:cNvPicPr>
+            <a:picLocks noChangeAspect="1"/>
+          </p:cNvPicPr>
+          <p:nvPr/>
+        </p:nvPicPr>
+        <p:blipFill>
+          <a:blip r:embed="rId3"/>
+          <a:stretch>
+            <a:fillRect/>
+          </a:stretch>
+        </p:blipFill>
+        <p:spPr>
+          <a:xfrm>
+            <a:off x="1146149" y="1543766"/>
+            <a:ext cx="1992202" cy="474854"/>
+          </a:xfrm>
+          <a:prstGeom prst="rect">
+            <a:avLst/>
+          </a:prstGeom>
+        </p:spPr>
+      </p:pic>
     </p:spTree>
     <p:extLst>
       <p:ext uri="{BB962C8B-B14F-4D97-AF65-F5344CB8AC3E}">

</xml_diff>